<commit_message>
changes to 0118 slides
</commit_message>
<xml_diff>
--- a/slides/0118Recitation.pptx
+++ b/slides/0118Recitation.pptx
@@ -5,7 +5,7 @@
     <p:sldMasterId id="2147483648" r:id="rId1"/>
   </p:sldMasterIdLst>
   <p:notesMasterIdLst>
-    <p:notesMasterId r:id="rId15"/>
+    <p:notesMasterId r:id="rId14"/>
   </p:notesMasterIdLst>
   <p:sldIdLst>
     <p:sldId id="256" r:id="rId2"/>
@@ -20,7 +20,6 @@
     <p:sldId id="276" r:id="rId11"/>
     <p:sldId id="298" r:id="rId12"/>
     <p:sldId id="299" r:id="rId13"/>
-    <p:sldId id="296" r:id="rId14"/>
   </p:sldIdLst>
   <p:sldSz cx="12192000" cy="6858000"/>
   <p:notesSz cx="6858000" cy="9144000"/>
@@ -209,7 +208,7 @@
           <a:p>
             <a:fld id="{4B2C3995-10D3-7249-9CF2-C18001382AD9}" type="datetimeFigureOut">
               <a:rPr lang="en-US" smtClean="0"/>
-              <a:t>1/17/22</a:t>
+              <a:t>1/18/22</a:t>
             </a:fld>
             <a:endParaRPr lang="en-US"/>
           </a:p>
@@ -1332,7 +1331,7 @@
           <a:p>
             <a:fld id="{4AAD347D-5ACD-4C99-B74B-A9C85AD731AF}" type="datetimeFigureOut">
               <a:rPr lang="en-US" dirty="0"/>
-              <a:t>1/17/22</a:t>
+              <a:t>1/18/22</a:t>
             </a:fld>
             <a:endParaRPr lang="en-US" dirty="0"/>
           </a:p>
@@ -1602,7 +1601,7 @@
           <a:p>
             <a:fld id="{4509A250-FF31-4206-8172-F9D3106AACB1}" type="datetimeFigureOut">
               <a:rPr lang="en-US" dirty="0"/>
-              <a:t>1/17/22</a:t>
+              <a:t>1/18/22</a:t>
             </a:fld>
             <a:endParaRPr lang="en-US" dirty="0"/>
           </a:p>
@@ -1791,7 +1790,7 @@
           <a:p>
             <a:fld id="{4509A250-FF31-4206-8172-F9D3106AACB1}" type="datetimeFigureOut">
               <a:rPr lang="en-US" dirty="0"/>
-              <a:t>1/17/22</a:t>
+              <a:t>1/18/22</a:t>
             </a:fld>
             <a:endParaRPr lang="en-US" dirty="0"/>
           </a:p>
@@ -2059,7 +2058,7 @@
           <a:p>
             <a:fld id="{4509A250-FF31-4206-8172-F9D3106AACB1}" type="datetimeFigureOut">
               <a:rPr lang="en-US" dirty="0"/>
-              <a:t>1/17/22</a:t>
+              <a:t>1/18/22</a:t>
             </a:fld>
             <a:endParaRPr lang="en-US" dirty="0"/>
           </a:p>
@@ -2395,7 +2394,7 @@
           <a:p>
             <a:fld id="{4509A250-FF31-4206-8172-F9D3106AACB1}" type="datetimeFigureOut">
               <a:rPr lang="en-US" dirty="0"/>
-              <a:t>1/17/22</a:t>
+              <a:t>1/18/22</a:t>
             </a:fld>
             <a:endParaRPr lang="en-US" dirty="0"/>
           </a:p>
@@ -3013,7 +3012,7 @@
           <a:p>
             <a:fld id="{4509A250-FF31-4206-8172-F9D3106AACB1}" type="datetimeFigureOut">
               <a:rPr lang="en-US" dirty="0"/>
-              <a:t>1/17/22</a:t>
+              <a:t>1/18/22</a:t>
             </a:fld>
             <a:endParaRPr lang="en-US" dirty="0"/>
           </a:p>
@@ -3868,7 +3867,7 @@
           <a:p>
             <a:fld id="{4509A250-FF31-4206-8172-F9D3106AACB1}" type="datetimeFigureOut">
               <a:rPr lang="en-US" dirty="0"/>
-              <a:t>1/17/22</a:t>
+              <a:t>1/18/22</a:t>
             </a:fld>
             <a:endParaRPr lang="en-US" dirty="0"/>
           </a:p>
@@ -4033,7 +4032,7 @@
           <a:p>
             <a:fld id="{4509A250-FF31-4206-8172-F9D3106AACB1}" type="datetimeFigureOut">
               <a:rPr lang="en-US" dirty="0"/>
-              <a:t>1/17/22</a:t>
+              <a:t>1/18/22</a:t>
             </a:fld>
             <a:endParaRPr lang="en-US" dirty="0"/>
           </a:p>
@@ -4208,7 +4207,7 @@
           <a:p>
             <a:fld id="{4509A250-FF31-4206-8172-F9D3106AACB1}" type="datetimeFigureOut">
               <a:rPr lang="en-US" dirty="0"/>
-              <a:t>1/17/22</a:t>
+              <a:t>1/18/22</a:t>
             </a:fld>
             <a:endParaRPr lang="en-US" dirty="0"/>
           </a:p>
@@ -4373,7 +4372,7 @@
           <a:p>
             <a:fld id="{4509A250-FF31-4206-8172-F9D3106AACB1}" type="datetimeFigureOut">
               <a:rPr lang="en-US" dirty="0"/>
-              <a:t>1/17/22</a:t>
+              <a:t>1/18/22</a:t>
             </a:fld>
             <a:endParaRPr lang="en-US" dirty="0"/>
           </a:p>
@@ -4615,7 +4614,7 @@
           <a:p>
             <a:fld id="{9796027F-7875-4030-9381-8BD8C4F21935}" type="datetimeFigureOut">
               <a:rPr lang="en-US" dirty="0"/>
-              <a:t>1/17/22</a:t>
+              <a:t>1/18/22</a:t>
             </a:fld>
             <a:endParaRPr lang="en-US" dirty="0"/>
           </a:p>
@@ -4902,7 +4901,7 @@
           <a:p>
             <a:fld id="{9796027F-7875-4030-9381-8BD8C4F21935}" type="datetimeFigureOut">
               <a:rPr lang="en-US" dirty="0"/>
-              <a:t>1/17/22</a:t>
+              <a:t>1/18/22</a:t>
             </a:fld>
             <a:endParaRPr lang="en-US" dirty="0"/>
           </a:p>
@@ -5341,7 +5340,7 @@
           <a:p>
             <a:fld id="{9796027F-7875-4030-9381-8BD8C4F21935}" type="datetimeFigureOut">
               <a:rPr lang="en-US" dirty="0"/>
-              <a:t>1/17/22</a:t>
+              <a:t>1/18/22</a:t>
             </a:fld>
             <a:endParaRPr lang="en-US" dirty="0"/>
           </a:p>
@@ -5454,7 +5453,7 @@
           <a:p>
             <a:fld id="{4509A250-FF31-4206-8172-F9D3106AACB1}" type="datetimeFigureOut">
               <a:rPr lang="en-US" dirty="0"/>
-              <a:t>1/17/22</a:t>
+              <a:t>1/18/22</a:t>
             </a:fld>
             <a:endParaRPr lang="en-US" dirty="0"/>
           </a:p>
@@ -5544,7 +5543,7 @@
           <a:p>
             <a:fld id="{4509A250-FF31-4206-8172-F9D3106AACB1}" type="datetimeFigureOut">
               <a:rPr lang="en-US" dirty="0"/>
-              <a:t>1/17/22</a:t>
+              <a:t>1/18/22</a:t>
             </a:fld>
             <a:endParaRPr lang="en-US" dirty="0"/>
           </a:p>
@@ -5818,7 +5817,7 @@
           <a:p>
             <a:fld id="{4509A250-FF31-4206-8172-F9D3106AACB1}" type="datetimeFigureOut">
               <a:rPr lang="en-US" dirty="0"/>
-              <a:t>1/17/22</a:t>
+              <a:t>1/18/22</a:t>
             </a:fld>
             <a:endParaRPr lang="en-US" dirty="0"/>
           </a:p>
@@ -6088,7 +6087,7 @@
           <a:p>
             <a:fld id="{4509A250-FF31-4206-8172-F9D3106AACB1}" type="datetimeFigureOut">
               <a:rPr lang="en-US" dirty="0"/>
-              <a:t>1/17/22</a:t>
+              <a:t>1/18/22</a:t>
             </a:fld>
             <a:endParaRPr lang="en-US" dirty="0"/>
           </a:p>
@@ -6512,7 +6511,7 @@
           <a:p>
             <a:fld id="{4AAD347D-5ACD-4C99-B74B-A9C85AD731AF}" type="datetimeFigureOut">
               <a:rPr lang="en-US" dirty="0"/>
-              <a:t>1/17/22</a:t>
+              <a:t>1/18/22</a:t>
             </a:fld>
             <a:endParaRPr lang="en-US" dirty="0"/>
           </a:p>
@@ -7584,7 +7583,7 @@
                 <a:latin typeface="Century Gothic" panose="020B0502020202020204" pitchFamily="34" charset="0"/>
                 <a:cs typeface="Courier New" panose="02070309020205020404" pitchFamily="49" charset="0"/>
               </a:rPr>
-              <a:t>() // .next takes the next line as a String</a:t>
+              <a:t>() // .next takes the next token as a String</a:t>
             </a:r>
           </a:p>
           <a:p>
@@ -7988,166 +7987,6 @@
     <p:extLst>
       <p:ext uri="{BB962C8B-B14F-4D97-AF65-F5344CB8AC3E}">
         <p14:creationId xmlns:p14="http://schemas.microsoft.com/office/powerpoint/2010/main" val="2576588428"/>
-      </p:ext>
-    </p:extLst>
-  </p:cSld>
-  <p:clrMapOvr>
-    <a:masterClrMapping/>
-  </p:clrMapOvr>
-</p:sld>
-</file>
-
-<file path=ppt/slides/slide13.xml><?xml version="1.0" encoding="utf-8"?>
-<p:sld xmlns:a="http://schemas.openxmlformats.org/drawingml/2006/main" xmlns:r="http://schemas.openxmlformats.org/officeDocument/2006/relationships" xmlns:p="http://schemas.openxmlformats.org/presentationml/2006/main">
-  <p:cSld>
-    <p:spTree>
-      <p:nvGrpSpPr>
-        <p:cNvPr id="1" name=""/>
-        <p:cNvGrpSpPr/>
-        <p:nvPr/>
-      </p:nvGrpSpPr>
-      <p:grpSpPr>
-        <a:xfrm>
-          <a:off x="0" y="0"/>
-          <a:ext cx="0" cy="0"/>
-          <a:chOff x="0" y="0"/>
-          <a:chExt cx="0" cy="0"/>
-        </a:xfrm>
-      </p:grpSpPr>
-      <p:sp>
-        <p:nvSpPr>
-          <p:cNvPr id="2" name="Title 1">
-            <a:extLst>
-              <a:ext uri="{FF2B5EF4-FFF2-40B4-BE49-F238E27FC236}">
-                <a16:creationId xmlns:a16="http://schemas.microsoft.com/office/drawing/2014/main" id="{3234DFAE-A1D7-4269-8C7D-59F2F5C7CAB5}"/>
-              </a:ext>
-            </a:extLst>
-          </p:cNvPr>
-          <p:cNvSpPr>
-            <a:spLocks noGrp="1"/>
-          </p:cNvSpPr>
-          <p:nvPr>
-            <p:ph type="title"/>
-          </p:nvPr>
-        </p:nvSpPr>
-        <p:spPr/>
-        <p:txBody>
-          <a:bodyPr/>
-          <a:lstStyle/>
-          <a:p>
-            <a:r>
-              <a:rPr lang="en-US" dirty="0"/>
-              <a:t>Lab1</a:t>
-            </a:r>
-          </a:p>
-        </p:txBody>
-      </p:sp>
-      <p:sp>
-        <p:nvSpPr>
-          <p:cNvPr id="3" name="Content Placeholder 2">
-            <a:extLst>
-              <a:ext uri="{FF2B5EF4-FFF2-40B4-BE49-F238E27FC236}">
-                <a16:creationId xmlns:a16="http://schemas.microsoft.com/office/drawing/2014/main" id="{2F3E680D-9E01-4E60-B7BD-F8FA06BD0E39}"/>
-              </a:ext>
-            </a:extLst>
-          </p:cNvPr>
-          <p:cNvSpPr>
-            <a:spLocks noGrp="1"/>
-          </p:cNvSpPr>
-          <p:nvPr>
-            <p:ph idx="1"/>
-          </p:nvPr>
-        </p:nvSpPr>
-        <p:spPr>
-          <a:xfrm>
-            <a:off x="1141412" y="2249486"/>
-            <a:ext cx="9905999" cy="4445604"/>
-          </a:xfrm>
-        </p:spPr>
-        <p:txBody>
-          <a:bodyPr>
-            <a:normAutofit/>
-          </a:bodyPr>
-          <a:lstStyle/>
-          <a:p>
-            <a:pPr marL="0" indent="0">
-              <a:buNone/>
-            </a:pPr>
-            <a:r>
-              <a:rPr lang="en-US" dirty="0"/>
-              <a:t>Assignment: </a:t>
-            </a:r>
-          </a:p>
-          <a:p>
-            <a:r>
-              <a:rPr lang="en-US" dirty="0">
-                <a:hlinkClick r:id="rId2"/>
-              </a:rPr>
-              <a:t>https://canvas.pitt.edu/courses/127916/assignments/820334?module_item_id=2735229</a:t>
-            </a:r>
-            <a:endParaRPr lang="en-US" dirty="0"/>
-          </a:p>
-          <a:p>
-            <a:pPr marL="0" indent="0">
-              <a:buNone/>
-            </a:pPr>
-            <a:r>
-              <a:rPr lang="en-US" dirty="0"/>
-              <a:t>Starter Code:</a:t>
-            </a:r>
-          </a:p>
-          <a:p>
-            <a:r>
-              <a:rPr lang="en-US" dirty="0">
-                <a:hlinkClick r:id="rId3"/>
-              </a:rPr>
-              <a:t>https://</a:t>
-            </a:r>
-            <a:r>
-              <a:rPr lang="en-US" dirty="0" err="1">
-                <a:hlinkClick r:id="rId3"/>
-              </a:rPr>
-              <a:t>canvas.pitt.edu</a:t>
-            </a:r>
-            <a:r>
-              <a:rPr lang="en-US" dirty="0">
-                <a:hlinkClick r:id="rId3"/>
-              </a:rPr>
-              <a:t>/courses/127916/files/8050341?module_item_id=2735228</a:t>
-            </a:r>
-            <a:endParaRPr lang="en-US" dirty="0"/>
-          </a:p>
-          <a:p>
-            <a:pPr marL="0" indent="0">
-              <a:buNone/>
-            </a:pPr>
-            <a:endParaRPr lang="en-US" dirty="0"/>
-          </a:p>
-          <a:p>
-            <a:r>
-              <a:rPr lang="en-US" dirty="0"/>
-              <a:t>Once compiled and run this should print out:</a:t>
-            </a:r>
-          </a:p>
-          <a:p>
-            <a:pPr lvl="1"/>
-            <a:r>
-              <a:rPr lang="en-US" dirty="0"/>
-              <a:t>“Hello this is [your name’s] first program”</a:t>
-            </a:r>
-          </a:p>
-          <a:p>
-            <a:r>
-              <a:rPr lang="en-US" dirty="0"/>
-              <a:t>You should be submitted both a screenshot of the output and your .java file (don’t submit the .class file because the grader cannot view the code)</a:t>
-            </a:r>
-          </a:p>
-        </p:txBody>
-      </p:sp>
-    </p:spTree>
-    <p:extLst>
-      <p:ext uri="{BB962C8B-B14F-4D97-AF65-F5344CB8AC3E}">
-        <p14:creationId xmlns:p14="http://schemas.microsoft.com/office/powerpoint/2010/main" val="1656288376"/>
       </p:ext>
     </p:extLst>
   </p:cSld>

</xml_diff>